<commit_message>
Modified cn and os ppt
</commit_message>
<xml_diff>
--- a/03. Computer Networks/PPTs/2.6. Gigabit Ethernet, Bridges, Switches.pptx
+++ b/03. Computer Networks/PPTs/2.6. Gigabit Ethernet, Bridges, Switches.pptx
@@ -18,11 +18,11 @@
     <p:sldId id="266" r:id="rId12"/>
     <p:sldId id="267" r:id="rId13"/>
     <p:sldId id="268" r:id="rId14"/>
-    <p:sldId id="269" r:id="rId15"/>
-    <p:sldId id="272" r:id="rId16"/>
-    <p:sldId id="273" r:id="rId17"/>
-    <p:sldId id="274" r:id="rId18"/>
-    <p:sldId id="270" r:id="rId19"/>
+    <p:sldId id="272" r:id="rId15"/>
+    <p:sldId id="273" r:id="rId16"/>
+    <p:sldId id="274" r:id="rId17"/>
+    <p:sldId id="270" r:id="rId18"/>
+    <p:sldId id="275" r:id="rId19"/>
     <p:sldId id="271" r:id="rId20"/>
   </p:sldIdLst>
   <p:sldSz cx="9144000" cy="6858000" type="screen4x3"/>
@@ -321,7 +321,7 @@
             <a:fld id="{1D8BD707-D9CF-40AE-B4C6-C98DA3205C09}" type="datetimeFigureOut">
               <a:rPr lang="en-US" smtClean="0"/>
               <a:pPr/>
-              <a:t>3/30/2020</a:t>
+              <a:t>4/24/2020</a:t>
             </a:fld>
             <a:endParaRPr lang="en-US"/>
           </a:p>
@@ -486,7 +486,7 @@
             <a:fld id="{1D8BD707-D9CF-40AE-B4C6-C98DA3205C09}" type="datetimeFigureOut">
               <a:rPr lang="en-US" smtClean="0"/>
               <a:pPr/>
-              <a:t>3/30/2020</a:t>
+              <a:t>4/24/2020</a:t>
             </a:fld>
             <a:endParaRPr lang="en-US"/>
           </a:p>
@@ -661,7 +661,7 @@
             <a:fld id="{1D8BD707-D9CF-40AE-B4C6-C98DA3205C09}" type="datetimeFigureOut">
               <a:rPr lang="en-US" smtClean="0"/>
               <a:pPr/>
-              <a:t>3/30/2020</a:t>
+              <a:t>4/24/2020</a:t>
             </a:fld>
             <a:endParaRPr lang="en-US"/>
           </a:p>
@@ -826,7 +826,7 @@
             <a:fld id="{1D8BD707-D9CF-40AE-B4C6-C98DA3205C09}" type="datetimeFigureOut">
               <a:rPr lang="en-US" smtClean="0"/>
               <a:pPr/>
-              <a:t>3/30/2020</a:t>
+              <a:t>4/24/2020</a:t>
             </a:fld>
             <a:endParaRPr lang="en-US"/>
           </a:p>
@@ -1068,7 +1068,7 @@
             <a:fld id="{1D8BD707-D9CF-40AE-B4C6-C98DA3205C09}" type="datetimeFigureOut">
               <a:rPr lang="en-US" smtClean="0"/>
               <a:pPr/>
-              <a:t>3/30/2020</a:t>
+              <a:t>4/24/2020</a:t>
             </a:fld>
             <a:endParaRPr lang="en-US"/>
           </a:p>
@@ -1350,7 +1350,7 @@
             <a:fld id="{1D8BD707-D9CF-40AE-B4C6-C98DA3205C09}" type="datetimeFigureOut">
               <a:rPr lang="en-US" smtClean="0"/>
               <a:pPr/>
-              <a:t>3/30/2020</a:t>
+              <a:t>4/24/2020</a:t>
             </a:fld>
             <a:endParaRPr lang="en-US"/>
           </a:p>
@@ -1766,7 +1766,7 @@
             <a:fld id="{1D8BD707-D9CF-40AE-B4C6-C98DA3205C09}" type="datetimeFigureOut">
               <a:rPr lang="en-US" smtClean="0"/>
               <a:pPr/>
-              <a:t>3/30/2020</a:t>
+              <a:t>4/24/2020</a:t>
             </a:fld>
             <a:endParaRPr lang="en-US"/>
           </a:p>
@@ -1880,7 +1880,7 @@
             <a:fld id="{1D8BD707-D9CF-40AE-B4C6-C98DA3205C09}" type="datetimeFigureOut">
               <a:rPr lang="en-US" smtClean="0"/>
               <a:pPr/>
-              <a:t>3/30/2020</a:t>
+              <a:t>4/24/2020</a:t>
             </a:fld>
             <a:endParaRPr lang="en-US"/>
           </a:p>
@@ -1972,7 +1972,7 @@
             <a:fld id="{1D8BD707-D9CF-40AE-B4C6-C98DA3205C09}" type="datetimeFigureOut">
               <a:rPr lang="en-US" smtClean="0"/>
               <a:pPr/>
-              <a:t>3/30/2020</a:t>
+              <a:t>4/24/2020</a:t>
             </a:fld>
             <a:endParaRPr lang="en-US"/>
           </a:p>
@@ -2244,7 +2244,7 @@
             <a:fld id="{1D8BD707-D9CF-40AE-B4C6-C98DA3205C09}" type="datetimeFigureOut">
               <a:rPr lang="en-US" smtClean="0"/>
               <a:pPr/>
-              <a:t>3/30/2020</a:t>
+              <a:t>4/24/2020</a:t>
             </a:fld>
             <a:endParaRPr lang="en-US"/>
           </a:p>
@@ -2493,7 +2493,7 @@
             <a:fld id="{1D8BD707-D9CF-40AE-B4C6-C98DA3205C09}" type="datetimeFigureOut">
               <a:rPr lang="en-US" smtClean="0"/>
               <a:pPr/>
-              <a:t>3/30/2020</a:t>
+              <a:t>4/24/2020</a:t>
             </a:fld>
             <a:endParaRPr lang="en-US"/>
           </a:p>
@@ -2701,7 +2701,7 @@
             <a:fld id="{1D8BD707-D9CF-40AE-B4C6-C98DA3205C09}" type="datetimeFigureOut">
               <a:rPr lang="en-US" smtClean="0"/>
               <a:pPr/>
-              <a:t>3/30/2020</a:t>
+              <a:t>4/24/2020</a:t>
             </a:fld>
             <a:endParaRPr lang="en-US"/>
           </a:p>
@@ -3446,27 +3446,71 @@
           </a:xfrm>
         </p:spPr>
         <p:txBody>
-          <a:bodyPr/>
+          <a:bodyPr>
+            <a:normAutofit/>
+          </a:bodyPr>
           <a:lstStyle/>
           <a:p>
             <a:pPr algn="just"/>
             <a:r>
-              <a:rPr lang="en-US" dirty="0"/>
-              <a:t>A bridge connects two or more LANs. It operates at data link layer.</a:t>
+              <a:rPr lang="en-US" sz="2600" dirty="0"/>
+              <a:t>A bridge connects two or more LANs. It operates at </a:t>
+            </a:r>
+            <a:r>
+              <a:rPr lang="en-US" sz="2600" dirty="0">
+                <a:solidFill>
+                  <a:srgbClr val="0070C0"/>
+                </a:solidFill>
+              </a:rPr>
+              <a:t>data link layer</a:t>
+            </a:r>
+            <a:r>
+              <a:rPr lang="en-US" sz="2600" dirty="0"/>
+              <a:t>.</a:t>
             </a:r>
           </a:p>
           <a:p>
             <a:pPr algn="just"/>
             <a:r>
-              <a:rPr lang="en-US" dirty="0"/>
+              <a:rPr lang="en-US" sz="2600" dirty="0"/>
               <a:t>Like a hub, a modern bridge has multiple ports, usually enough for 4 to 48 input lines of a certain type. Unlike in a hub, each port is isolated to be its own collision domain.</a:t>
             </a:r>
           </a:p>
           <a:p>
             <a:pPr algn="just"/>
             <a:r>
-              <a:rPr lang="en-US" dirty="0"/>
+              <a:rPr lang="en-US" sz="2600" dirty="0"/>
               <a:t>When a frame arrives, the bridge extracts the destination address (for Ethernet, it is 48 bit) from the frame header and looks it up in a table to see where to send the frame.</a:t>
+            </a:r>
+          </a:p>
+          <a:p>
+            <a:pPr algn="just"/>
+            <a:r>
+              <a:rPr lang="en-US" sz="2600" dirty="0"/>
+              <a:t>The bridge only outputs the frame on the port where it is needed and can forward multiple frames at the same time. </a:t>
+            </a:r>
+          </a:p>
+          <a:p>
+            <a:pPr algn="just"/>
+            <a:r>
+              <a:rPr lang="en-US" sz="2600" i="1" dirty="0">
+                <a:latin typeface="Garamond" panose="02020404030301010803" pitchFamily="18" charset="0"/>
+              </a:rPr>
+              <a:t>Filtering, forwarding </a:t>
+            </a:r>
+            <a:r>
+              <a:rPr lang="en-US" sz="2600" dirty="0"/>
+              <a:t>and</a:t>
+            </a:r>
+            <a:r>
+              <a:rPr lang="en-US" sz="2600" i="1" dirty="0">
+                <a:latin typeface="Garamond" panose="02020404030301010803" pitchFamily="18" charset="0"/>
+              </a:rPr>
+              <a:t> blocking of frames </a:t>
+            </a:r>
+            <a:r>
+              <a:rPr lang="en-US" sz="2600" dirty="0"/>
+              <a:t>are functions of bridges. </a:t>
             </a:r>
           </a:p>
         </p:txBody>
@@ -3518,20 +3562,29 @@
           </a:xfrm>
         </p:spPr>
         <p:txBody>
-          <a:bodyPr/>
+          <a:bodyPr>
+            <a:normAutofit/>
+          </a:bodyPr>
           <a:lstStyle/>
           <a:p>
             <a:pPr algn="just"/>
             <a:r>
-              <a:rPr lang="en-US" dirty="0"/>
-              <a:t>The bridge only outputs the frame on the port where it is needed and can forward multiple frames at the same time. Filtering, forwarding and blocking of frames are functions of bridges.</a:t>
+              <a:rPr lang="en-US" sz="2600" dirty="0"/>
+              <a:t>Bridges offer much better performance than hubs and the isolation between bridge ports also means that the input lines may run at different speeds, possibly even with different network types. A common example is a bridge with ports that connect to 10-, 100-, and 1000-Mbps Ethernet.</a:t>
             </a:r>
           </a:p>
           <a:p>
             <a:pPr algn="just"/>
             <a:r>
-              <a:rPr lang="en-US" dirty="0"/>
-              <a:t>Bridges offer much better performance than hubs and the isolation between bridge ports also means that the input lines may run at different speeds, possibly even with different network types. A common example is a bridge with ports that connect to 10-, 100-, and 1000-Mbps Ethernet.</a:t>
+              <a:rPr lang="en-US" sz="2600" dirty="0"/>
+              <a:t>Buffering within the bridge is needed to accept a frame on one port and transmit the frame out on a different port.</a:t>
+            </a:r>
+          </a:p>
+          <a:p>
+            <a:pPr algn="just"/>
+            <a:r>
+              <a:rPr lang="en-US" sz="2600" dirty="0"/>
+              <a:t>Bridges were originally intended to be able to join different kinds of LANs, for example, an Ethernet and a Token Ring LAN. However, this never worked well because of differences between the LANs such as frame formats, maximum frame lengths, security and Quality of service.</a:t>
             </a:r>
           </a:p>
         </p:txBody>
@@ -3568,37 +3621,78 @@
       </p:grpSpPr>
       <p:sp>
         <p:nvSpPr>
-          <p:cNvPr id="3" name="Content Placeholder 2"/>
-          <p:cNvSpPr>
-            <a:spLocks noGrp="1"/>
-          </p:cNvSpPr>
-          <p:nvPr>
-            <p:ph idx="1"/>
-          </p:nvPr>
-        </p:nvSpPr>
-        <p:spPr>
-          <a:xfrm>
-            <a:off x="0" y="381000"/>
-            <a:ext cx="8686800" cy="5745163"/>
-          </a:xfrm>
-        </p:spPr>
+          <p:cNvPr id="2" name="Title 1"/>
+          <p:cNvSpPr>
+            <a:spLocks noGrp="1"/>
+          </p:cNvSpPr>
+          <p:nvPr>
+            <p:ph type="title"/>
+          </p:nvPr>
+        </p:nvSpPr>
+        <p:spPr/>
         <p:txBody>
           <a:bodyPr>
             <a:normAutofit/>
           </a:bodyPr>
           <a:lstStyle/>
           <a:p>
+            <a:r>
+              <a:rPr lang="en-US" b="1" dirty="0"/>
+              <a:t>Types of Bridges</a:t>
+            </a:r>
+            <a:endParaRPr lang="en-US" dirty="0"/>
+          </a:p>
+        </p:txBody>
+      </p:sp>
+      <p:sp>
+        <p:nvSpPr>
+          <p:cNvPr id="3" name="Content Placeholder 2"/>
+          <p:cNvSpPr>
+            <a:spLocks noGrp="1"/>
+          </p:cNvSpPr>
+          <p:nvPr>
+            <p:ph idx="1"/>
+          </p:nvPr>
+        </p:nvSpPr>
+        <p:spPr>
+          <a:xfrm>
+            <a:off x="0" y="1417638"/>
+            <a:ext cx="8839200" cy="5440362"/>
+          </a:xfrm>
+        </p:spPr>
+        <p:txBody>
+          <a:bodyPr/>
+          <a:lstStyle/>
+          <a:p>
             <a:pPr algn="just"/>
             <a:r>
+              <a:rPr lang="en-US" b="1" dirty="0"/>
+              <a:t>Transparent bridge</a:t>
+            </a:r>
+            <a:r>
               <a:rPr lang="en-US" dirty="0"/>
-              <a:t>Buffering within the bridge is needed to accept a frame on one port and transmit the frame out on a different port.</a:t>
-            </a:r>
-          </a:p>
-          <a:p>
-            <a:pPr algn="just"/>
+              <a:t>—</a:t>
+            </a:r>
+          </a:p>
+          <a:p>
+            <a:pPr lvl="1" algn="just"/>
             <a:r>
               <a:rPr lang="en-US" dirty="0"/>
-              <a:t>Bridges were originally intended to be able to join different kinds of LANs, for example, an Ethernet and a Token Ring LAN. However, this never worked well because of differences between the LANs such as frame formats, maximum frame lengths, security and Quality of service.</a:t>
+              <a:t>A transparent bridge is invisible to the other devices on the network. </a:t>
+            </a:r>
+          </a:p>
+          <a:p>
+            <a:pPr lvl="1" algn="just"/>
+            <a:r>
+              <a:rPr lang="en-US" dirty="0"/>
+              <a:t>Transparent bridges perform only the function of blocking or forwarding data based on the MAC address; the devices on the network are oblivious to these bridges’ existence. </a:t>
+            </a:r>
+          </a:p>
+          <a:p>
+            <a:pPr lvl="1" algn="just"/>
+            <a:r>
+              <a:rPr lang="en-US" dirty="0"/>
+              <a:t>Transparent bridges are by far the most popular types of bridges.</a:t>
             </a:r>
           </a:p>
         </p:txBody>
@@ -3606,7 +3700,7 @@
     </p:spTree>
     <p:extLst>
       <p:ext uri="{BB962C8B-B14F-4D97-AF65-F5344CB8AC3E}">
-        <p14:creationId xmlns:p14="http://schemas.microsoft.com/office/powerpoint/2010/main" val="986677329"/>
+        <p14:creationId xmlns:p14="http://schemas.microsoft.com/office/powerpoint/2010/main" val="3184385277"/>
       </p:ext>
     </p:extLst>
   </p:cSld>
@@ -3635,57 +3729,62 @@
       </p:grpSpPr>
       <p:sp>
         <p:nvSpPr>
-          <p:cNvPr id="2" name="Title 1"/>
-          <p:cNvSpPr>
-            <a:spLocks noGrp="1"/>
-          </p:cNvSpPr>
-          <p:nvPr>
-            <p:ph type="title"/>
-          </p:nvPr>
-        </p:nvSpPr>
-        <p:spPr/>
+          <p:cNvPr id="3" name="Content Placeholder 2"/>
+          <p:cNvSpPr>
+            <a:spLocks noGrp="1"/>
+          </p:cNvSpPr>
+          <p:nvPr>
+            <p:ph idx="1"/>
+          </p:nvPr>
+        </p:nvSpPr>
+        <p:spPr>
+          <a:xfrm>
+            <a:off x="457200" y="990600"/>
+            <a:ext cx="8229600" cy="4525963"/>
+          </a:xfrm>
+        </p:spPr>
         <p:txBody>
           <a:bodyPr>
             <a:normAutofit/>
           </a:bodyPr>
           <a:lstStyle/>
           <a:p>
+            <a:pPr algn="just"/>
             <a:r>
               <a:rPr lang="en-US" b="1" dirty="0"/>
-              <a:t>Types of Bridges</a:t>
-            </a:r>
-            <a:endParaRPr lang="en-US" dirty="0"/>
-          </a:p>
-        </p:txBody>
-      </p:sp>
-      <p:sp>
-        <p:nvSpPr>
-          <p:cNvPr id="3" name="Content Placeholder 2"/>
-          <p:cNvSpPr>
-            <a:spLocks noGrp="1"/>
-          </p:cNvSpPr>
-          <p:nvPr>
-            <p:ph idx="1"/>
-          </p:nvPr>
-        </p:nvSpPr>
-        <p:spPr>
-          <a:xfrm>
-            <a:off x="0" y="1417638"/>
-            <a:ext cx="8915400" cy="5440362"/>
-          </a:xfrm>
-        </p:spPr>
-        <p:txBody>
-          <a:bodyPr/>
-          <a:lstStyle/>
-          <a:p>
-            <a:pPr algn="just"/>
-            <a:r>
-              <a:rPr lang="en-US" b="1" dirty="0"/>
-              <a:t>Transparent bridge</a:t>
+              <a:t>Translational bridge</a:t>
             </a:r>
             <a:r>
               <a:rPr lang="en-US" dirty="0"/>
-              <a:t>—A transparent bridge is invisible to the other devices on the network. Transparent bridges perform only the function of blocking or forwarding data based on the MAC address; the devices on the network are oblivious to these bridges’ existence. Transparent bridges are by far the most popular types of bridges.</a:t>
+              <a:t>—</a:t>
+            </a:r>
+          </a:p>
+          <a:p>
+            <a:pPr lvl="1" algn="just"/>
+            <a:r>
+              <a:rPr lang="en-US" dirty="0"/>
+              <a:t>A translational bridge can convert from one networking system to another. </a:t>
+            </a:r>
+          </a:p>
+          <a:p>
+            <a:pPr lvl="1" algn="just"/>
+            <a:r>
+              <a:rPr lang="en-US" dirty="0"/>
+              <a:t>As you might have guessed, it translates the data it receives. </a:t>
+            </a:r>
+          </a:p>
+          <a:p>
+            <a:pPr lvl="1" algn="just"/>
+            <a:r>
+              <a:rPr lang="en-US" dirty="0"/>
+              <a:t>Translational bridges are useful for connecting two different networks, such as Ethernet and Token Ring networks. </a:t>
+            </a:r>
+          </a:p>
+          <a:p>
+            <a:pPr lvl="1" algn="just"/>
+            <a:r>
+              <a:rPr lang="en-US" dirty="0"/>
+              <a:t>Depending on the direction of travel, a translational bridge can add or remove information and fields from the frame as needed.</a:t>
             </a:r>
           </a:p>
         </p:txBody>
@@ -3693,7 +3792,7 @@
     </p:spTree>
     <p:extLst>
       <p:ext uri="{BB962C8B-B14F-4D97-AF65-F5344CB8AC3E}">
-        <p14:creationId xmlns:p14="http://schemas.microsoft.com/office/powerpoint/2010/main" val="3184385277"/>
+        <p14:creationId xmlns:p14="http://schemas.microsoft.com/office/powerpoint/2010/main" val="2676311133"/>
       </p:ext>
     </p:extLst>
   </p:cSld>
@@ -3732,24 +3831,43 @@
         </p:nvSpPr>
         <p:spPr>
           <a:xfrm>
-            <a:off x="457200" y="990600"/>
-            <a:ext cx="8229600" cy="4525963"/>
+            <a:off x="76200" y="1600200"/>
+            <a:ext cx="8610600" cy="4525963"/>
           </a:xfrm>
         </p:spPr>
         <p:txBody>
-          <a:bodyPr>
-            <a:normAutofit/>
-          </a:bodyPr>
+          <a:bodyPr/>
           <a:lstStyle/>
           <a:p>
             <a:pPr algn="just"/>
             <a:r>
               <a:rPr lang="en-US" b="1" dirty="0"/>
-              <a:t>Translational bridge</a:t>
+              <a:t>Source-route bridge</a:t>
             </a:r>
             <a:r>
               <a:rPr lang="en-US" dirty="0"/>
-              <a:t>—A translational bridge can convert from one networking system to another. As you might have guessed, it translates the data it receives. Translational bridges are useful for connecting two different networks, such as Ethernet and Token Ring networks. Depending on the direction of travel, a translational bridge can add or remove information and fields from the frame as needed.</a:t>
+              <a:t>—</a:t>
+            </a:r>
+          </a:p>
+          <a:p>
+            <a:pPr lvl="1" algn="just"/>
+            <a:r>
+              <a:rPr lang="en-US" dirty="0"/>
+              <a:t>Source-route bridges were designed by IBM for use on Token Ring networks. </a:t>
+            </a:r>
+          </a:p>
+          <a:p>
+            <a:pPr lvl="1" algn="just"/>
+            <a:r>
+              <a:rPr lang="en-US" dirty="0"/>
+              <a:t>The source-route bridge derives its name from the fact that the entire route of the frame is embedded within the frame. </a:t>
+            </a:r>
+          </a:p>
+          <a:p>
+            <a:pPr lvl="1" algn="just"/>
+            <a:r>
+              <a:rPr lang="en-US" dirty="0"/>
+              <a:t>This allows the bridge to make specific decisions about how the frame should be forwarded through the network.</a:t>
             </a:r>
           </a:p>
         </p:txBody>
@@ -3757,7 +3875,7 @@
     </p:spTree>
     <p:extLst>
       <p:ext uri="{BB962C8B-B14F-4D97-AF65-F5344CB8AC3E}">
-        <p14:creationId xmlns:p14="http://schemas.microsoft.com/office/powerpoint/2010/main" val="2676311133"/>
+        <p14:creationId xmlns:p14="http://schemas.microsoft.com/office/powerpoint/2010/main" val="385166941"/>
       </p:ext>
     </p:extLst>
   </p:cSld>
@@ -3786,32 +3904,149 @@
       </p:grpSpPr>
       <p:sp>
         <p:nvSpPr>
-          <p:cNvPr id="3" name="Content Placeholder 2"/>
-          <p:cNvSpPr>
-            <a:spLocks noGrp="1"/>
-          </p:cNvSpPr>
-          <p:nvPr>
-            <p:ph idx="1"/>
+          <p:cNvPr id="2" name="Title 1"/>
+          <p:cNvSpPr>
+            <a:spLocks noGrp="1"/>
+          </p:cNvSpPr>
+          <p:nvPr>
+            <p:ph type="title"/>
           </p:nvPr>
         </p:nvSpPr>
         <p:spPr>
           <a:xfrm>
-            <a:off x="76200" y="1600200"/>
-            <a:ext cx="8610600" cy="4525963"/>
+            <a:off x="457200" y="8824"/>
+            <a:ext cx="8229600" cy="1143000"/>
           </a:xfrm>
         </p:spPr>
         <p:txBody>
-          <a:bodyPr/>
+          <a:bodyPr>
+            <a:normAutofit/>
+          </a:bodyPr>
+          <a:lstStyle/>
+          <a:p>
+            <a:r>
+              <a:rPr lang="en-US" b="1" dirty="0"/>
+              <a:t>Router:</a:t>
+            </a:r>
+            <a:endParaRPr lang="en-US" dirty="0"/>
+          </a:p>
+        </p:txBody>
+      </p:sp>
+      <p:sp>
+        <p:nvSpPr>
+          <p:cNvPr id="3" name="Content Placeholder 2"/>
+          <p:cNvSpPr>
+            <a:spLocks noGrp="1"/>
+          </p:cNvSpPr>
+          <p:nvPr>
+            <p:ph idx="1"/>
+          </p:nvPr>
+        </p:nvSpPr>
+        <p:spPr>
+          <a:xfrm>
+            <a:off x="152400" y="1151824"/>
+            <a:ext cx="8763000" cy="4715576"/>
+          </a:xfrm>
+        </p:spPr>
+        <p:txBody>
+          <a:bodyPr>
+            <a:normAutofit/>
+          </a:bodyPr>
           <a:lstStyle/>
           <a:p>
             <a:pPr algn="just"/>
             <a:r>
-              <a:rPr lang="en-US" b="1" dirty="0"/>
-              <a:t>Source-route bridge</a:t>
-            </a:r>
-            <a:r>
-              <a:rPr lang="en-US" dirty="0"/>
-              <a:t>—Source-route bridges were designed by IBM for use on Token Ring networks. The source-route bridge derives its name from the fact that the entire route of the frame is embedded within the frame. This allows the bridge to make specific decisions about how the frame should be forwarded through the network.</a:t>
+              <a:rPr lang="en-US" sz="2600" dirty="0">
+                <a:latin typeface="EB Garamond" panose="00000500000000000000" pitchFamily="2" charset="0"/>
+              </a:rPr>
+              <a:t>Routers are devices that connect two or more networks. It operates at </a:t>
+            </a:r>
+            <a:r>
+              <a:rPr lang="en-US" sz="2600" dirty="0">
+                <a:solidFill>
+                  <a:srgbClr val="002060"/>
+                </a:solidFill>
+                <a:latin typeface="EB Garamond" panose="00000500000000000000" pitchFamily="2" charset="0"/>
+              </a:rPr>
+              <a:t>network layer</a:t>
+            </a:r>
+            <a:r>
+              <a:rPr lang="en-US" sz="2600" dirty="0">
+                <a:latin typeface="EB Garamond" panose="00000500000000000000" pitchFamily="2" charset="0"/>
+              </a:rPr>
+              <a:t>.</a:t>
+            </a:r>
+          </a:p>
+          <a:p>
+            <a:pPr algn="just"/>
+            <a:r>
+              <a:rPr lang="en-US" sz="2600" dirty="0">
+                <a:latin typeface="EB Garamond" panose="00000500000000000000" pitchFamily="2" charset="0"/>
+              </a:rPr>
+              <a:t>They consist of a combination of hardware and software.</a:t>
+            </a:r>
+          </a:p>
+          <a:p>
+            <a:pPr algn="just"/>
+            <a:r>
+              <a:rPr lang="en-US" sz="2600" dirty="0">
+                <a:latin typeface="EB Garamond" panose="00000500000000000000" pitchFamily="2" charset="0"/>
+              </a:rPr>
+              <a:t>The </a:t>
+            </a:r>
+            <a:r>
+              <a:rPr lang="en-US" sz="2600" i="1" dirty="0">
+                <a:latin typeface="Garamond" panose="02020404030301010803" pitchFamily="18" charset="0"/>
+              </a:rPr>
+              <a:t>hardware</a:t>
+            </a:r>
+            <a:r>
+              <a:rPr lang="en-US" sz="2600" dirty="0">
+                <a:latin typeface="EB Garamond" panose="00000500000000000000" pitchFamily="2" charset="0"/>
+              </a:rPr>
+              <a:t> can be a network server, a separate computer or a special device. The hardware includes the physical interfaces to the various networks in the internetwork.</a:t>
+            </a:r>
+          </a:p>
+          <a:p>
+            <a:pPr algn="just"/>
+            <a:r>
+              <a:rPr lang="en-US" sz="2600" dirty="0">
+                <a:latin typeface="EB Garamond" panose="00000500000000000000" pitchFamily="2" charset="0"/>
+              </a:rPr>
+              <a:t>These interfaces can be Token Ring, Ethernet, T1, Frame Relay, ATM or any other technology.</a:t>
+            </a:r>
+          </a:p>
+          <a:p>
+            <a:pPr algn="just"/>
+            <a:r>
+              <a:rPr lang="en-US" sz="2600" dirty="0"/>
+              <a:t>The </a:t>
+            </a:r>
+            <a:r>
+              <a:rPr lang="en-US" sz="2600" i="1" dirty="0">
+                <a:latin typeface="Garamond" panose="02020404030301010803" pitchFamily="18" charset="0"/>
+              </a:rPr>
+              <a:t>software</a:t>
+            </a:r>
+            <a:r>
+              <a:rPr lang="en-US" sz="2600" dirty="0"/>
+              <a:t> in a router are the </a:t>
+            </a:r>
+            <a:r>
+              <a:rPr lang="en-US" sz="2600" b="1" dirty="0"/>
+              <a:t>operating system </a:t>
+            </a:r>
+            <a:r>
+              <a:rPr lang="en-US" sz="2600" dirty="0"/>
+              <a:t>and the </a:t>
+            </a:r>
+            <a:r>
+              <a:rPr lang="en-US" sz="2600" b="1" dirty="0"/>
+              <a:t>routing protocol</a:t>
+            </a:r>
+            <a:r>
+              <a:rPr lang="en-US" sz="2600" dirty="0"/>
+              <a:t>. Management software can also be used.</a:t>
             </a:r>
           </a:p>
         </p:txBody>
@@ -3819,7 +4054,7 @@
     </p:spTree>
     <p:extLst>
       <p:ext uri="{BB962C8B-B14F-4D97-AF65-F5344CB8AC3E}">
-        <p14:creationId xmlns:p14="http://schemas.microsoft.com/office/powerpoint/2010/main" val="385166941"/>
+        <p14:creationId xmlns:p14="http://schemas.microsoft.com/office/powerpoint/2010/main" val="283852166"/>
       </p:ext>
     </p:extLst>
   </p:cSld>
@@ -3848,18 +4083,24 @@
       </p:grpSpPr>
       <p:sp>
         <p:nvSpPr>
-          <p:cNvPr id="2" name="Title 1"/>
-          <p:cNvSpPr>
-            <a:spLocks noGrp="1"/>
-          </p:cNvSpPr>
-          <p:nvPr>
-            <p:ph type="title"/>
+          <p:cNvPr id="3" name="Content Placeholder 2">
+            <a:extLst>
+              <a:ext uri="{FF2B5EF4-FFF2-40B4-BE49-F238E27FC236}">
+                <a16:creationId xmlns:a16="http://schemas.microsoft.com/office/drawing/2014/main" id="{5AEA8B06-42EB-4DFE-B8EC-E50CE0298112}"/>
+              </a:ext>
+            </a:extLst>
+          </p:cNvPr>
+          <p:cNvSpPr>
+            <a:spLocks noGrp="1"/>
+          </p:cNvSpPr>
+          <p:nvPr>
+            <p:ph idx="1"/>
           </p:nvPr>
         </p:nvSpPr>
         <p:spPr>
           <a:xfrm>
-            <a:off x="457200" y="8824"/>
-            <a:ext cx="8229600" cy="1143000"/>
+            <a:off x="457200" y="533400"/>
+            <a:ext cx="8229600" cy="4525963"/>
           </a:xfrm>
         </p:spPr>
         <p:txBody>
@@ -3868,182 +4109,51 @@
           </a:bodyPr>
           <a:lstStyle/>
           <a:p>
-            <a:r>
-              <a:rPr lang="en-US" b="1" dirty="0"/>
-              <a:t>Router:</a:t>
-            </a:r>
-            <a:endParaRPr lang="en-US" dirty="0"/>
-          </a:p>
-        </p:txBody>
-      </p:sp>
-      <p:sp>
-        <p:nvSpPr>
-          <p:cNvPr id="3" name="Content Placeholder 2"/>
-          <p:cNvSpPr>
-            <a:spLocks noGrp="1"/>
-          </p:cNvSpPr>
-          <p:nvPr>
-            <p:ph idx="1"/>
-          </p:nvPr>
-        </p:nvSpPr>
-        <p:spPr>
-          <a:xfrm>
-            <a:off x="152400" y="990600"/>
-            <a:ext cx="8915400" cy="5858576"/>
-          </a:xfrm>
-        </p:spPr>
-        <p:txBody>
-          <a:bodyPr>
-            <a:normAutofit fontScale="92500" lnSpcReduction="10000"/>
-          </a:bodyPr>
-          <a:lstStyle/>
-          <a:p>
             <a:pPr algn="just"/>
             <a:r>
-              <a:rPr lang="en-US" sz="2400" dirty="0">
-                <a:latin typeface="EB Garamond" panose="00000500000000000000" pitchFamily="2" charset="0"/>
-              </a:rPr>
-              <a:t>Routers are devices that connect two or more networks. It operates at </a:t>
-            </a:r>
-            <a:r>
-              <a:rPr lang="en-US" sz="2400" dirty="0">
+              <a:rPr lang="en-US" sz="2600" dirty="0"/>
+              <a:t>Routers use </a:t>
+            </a:r>
+            <a:r>
+              <a:rPr lang="en-US" sz="2600" dirty="0">
                 <a:solidFill>
                   <a:srgbClr val="002060"/>
                 </a:solidFill>
-                <a:latin typeface="EB Garamond" panose="00000500000000000000" pitchFamily="2" charset="0"/>
-              </a:rPr>
-              <a:t>network layer</a:t>
-            </a:r>
-            <a:r>
-              <a:rPr lang="en-US" sz="2400" dirty="0">
-                <a:latin typeface="EB Garamond" panose="00000500000000000000" pitchFamily="2" charset="0"/>
-              </a:rPr>
-              <a:t>.</a:t>
-            </a:r>
-          </a:p>
-          <a:p>
-            <a:pPr algn="just"/>
-            <a:r>
-              <a:rPr lang="en-US" sz="2400" dirty="0">
-                <a:latin typeface="EB Garamond" panose="00000500000000000000" pitchFamily="2" charset="0"/>
-              </a:rPr>
-              <a:t>They consist of a combination of hardware and software.</a:t>
-            </a:r>
-          </a:p>
-          <a:p>
-            <a:pPr algn="just"/>
-            <a:r>
-              <a:rPr lang="en-US" sz="2400" dirty="0">
-                <a:latin typeface="EB Garamond" panose="00000500000000000000" pitchFamily="2" charset="0"/>
-              </a:rPr>
-              <a:t>The hardware can be a network server, a separate computer or a special device. The hardware includes the physical interfaces to the various networks in the internetwork.</a:t>
-            </a:r>
-          </a:p>
-          <a:p>
-            <a:pPr algn="just"/>
-            <a:r>
-              <a:rPr lang="en-US" sz="2400" dirty="0">
-                <a:latin typeface="EB Garamond" panose="00000500000000000000" pitchFamily="2" charset="0"/>
-              </a:rPr>
-              <a:t>These interfaces can be Token Ring, Ethernet, T1, Frame Relay, ATM or any other technology.</a:t>
-            </a:r>
-          </a:p>
-          <a:p>
-            <a:pPr algn="just"/>
-            <a:r>
-              <a:rPr lang="en-US" sz="2400" dirty="0">
-                <a:latin typeface="EB Garamond" panose="00000500000000000000" pitchFamily="2" charset="0"/>
-              </a:rPr>
-              <a:t>The software in a router are the </a:t>
-            </a:r>
-            <a:r>
-              <a:rPr lang="en-US" sz="2400" b="1" dirty="0">
-                <a:latin typeface="EB Garamond" panose="00000500000000000000" pitchFamily="2" charset="0"/>
-              </a:rPr>
-              <a:t>operating system </a:t>
-            </a:r>
-            <a:r>
-              <a:rPr lang="en-US" sz="2400" dirty="0">
-                <a:latin typeface="EB Garamond" panose="00000500000000000000" pitchFamily="2" charset="0"/>
-              </a:rPr>
-              <a:t>and the </a:t>
-            </a:r>
-            <a:r>
-              <a:rPr lang="en-US" sz="2400" b="1" dirty="0">
-                <a:latin typeface="EB Garamond" panose="00000500000000000000" pitchFamily="2" charset="0"/>
-              </a:rPr>
-              <a:t>routing protocol</a:t>
-            </a:r>
-            <a:r>
-              <a:rPr lang="en-US" sz="2400" dirty="0">
-                <a:latin typeface="EB Garamond" panose="00000500000000000000" pitchFamily="2" charset="0"/>
-              </a:rPr>
-              <a:t>. Management software can also be used.</a:t>
-            </a:r>
-          </a:p>
-          <a:p>
-            <a:pPr algn="just"/>
-            <a:r>
-              <a:rPr lang="en-US" sz="2400" dirty="0">
-                <a:latin typeface="EB Garamond" panose="00000500000000000000" pitchFamily="2" charset="0"/>
-              </a:rPr>
-              <a:t>Routers use </a:t>
-            </a:r>
-            <a:r>
-              <a:rPr lang="en-US" sz="2400" dirty="0">
-                <a:solidFill>
-                  <a:srgbClr val="002060"/>
-                </a:solidFill>
-                <a:latin typeface="EB Garamond" panose="00000500000000000000" pitchFamily="2" charset="0"/>
               </a:rPr>
               <a:t>logical and physical addressing </a:t>
             </a:r>
             <a:r>
-              <a:rPr lang="en-US" sz="2400" dirty="0">
-                <a:latin typeface="EB Garamond" panose="00000500000000000000" pitchFamily="2" charset="0"/>
-              </a:rPr>
+              <a:rPr lang="en-US" sz="2600" dirty="0"/>
               <a:t>to connect two or more logically separate networks.</a:t>
             </a:r>
           </a:p>
           <a:p>
             <a:pPr algn="just"/>
             <a:r>
-              <a:rPr lang="en-US" sz="2400" dirty="0">
-                <a:latin typeface="EB Garamond" panose="00000500000000000000" pitchFamily="2" charset="0"/>
-              </a:rPr>
+              <a:rPr lang="en-US" sz="2600" dirty="0"/>
               <a:t>The network address allows routers to calculate the optimal path to a workstation or computer.</a:t>
             </a:r>
           </a:p>
           <a:p>
             <a:pPr algn="just"/>
             <a:r>
-              <a:rPr lang="en-US" sz="2400" dirty="0">
-                <a:latin typeface="EB Garamond" panose="00000500000000000000" pitchFamily="2" charset="0"/>
-              </a:rPr>
+              <a:rPr lang="en-US" sz="2600" dirty="0"/>
               <a:t>The two methods of route discovery are </a:t>
             </a:r>
             <a:r>
-              <a:rPr lang="en-US" sz="2400" b="1" dirty="0">
-                <a:latin typeface="EB Garamond" panose="00000500000000000000" pitchFamily="2" charset="0"/>
-              </a:rPr>
+              <a:rPr lang="en-US" sz="2600" b="1" dirty="0"/>
               <a:t>Distance vector routing </a:t>
             </a:r>
             <a:r>
-              <a:rPr lang="en-US" sz="2400" dirty="0">
-                <a:latin typeface="EB Garamond" panose="00000500000000000000" pitchFamily="2" charset="0"/>
-              </a:rPr>
+              <a:rPr lang="en-US" sz="2600" dirty="0"/>
               <a:t>and </a:t>
             </a:r>
             <a:r>
-              <a:rPr lang="en-US" sz="2400" b="1" dirty="0">
-                <a:latin typeface="EB Garamond" panose="00000500000000000000" pitchFamily="2" charset="0"/>
-              </a:rPr>
+              <a:rPr lang="en-US" sz="2600" b="1" dirty="0"/>
               <a:t>Link state routing</a:t>
             </a:r>
             <a:r>
-              <a:rPr lang="en-US" sz="2400" dirty="0">
-                <a:latin typeface="EB Garamond" panose="00000500000000000000" pitchFamily="2" charset="0"/>
-              </a:rPr>
+              <a:rPr lang="en-US" sz="2600" dirty="0"/>
               <a:t>. </a:t>
             </a:r>
           </a:p>
@@ -4052,7 +4162,7 @@
     </p:spTree>
     <p:extLst>
       <p:ext uri="{BB962C8B-B14F-4D97-AF65-F5344CB8AC3E}">
-        <p14:creationId xmlns:p14="http://schemas.microsoft.com/office/powerpoint/2010/main" val="283852166"/>
+        <p14:creationId xmlns:p14="http://schemas.microsoft.com/office/powerpoint/2010/main" val="780379834"/>
       </p:ext>
     </p:extLst>
   </p:cSld>
@@ -4119,68 +4229,68 @@
         </p:nvSpPr>
         <p:spPr>
           <a:xfrm>
-            <a:off x="0" y="1219200"/>
-            <a:ext cx="8686800" cy="5638800"/>
+            <a:off x="228600" y="1143000"/>
+            <a:ext cx="8686800" cy="5715000"/>
           </a:xfrm>
         </p:spPr>
         <p:txBody>
           <a:bodyPr>
-            <a:normAutofit lnSpcReduction="10000"/>
+            <a:normAutofit/>
           </a:bodyPr>
           <a:lstStyle/>
           <a:p>
             <a:pPr algn="just"/>
             <a:r>
-              <a:rPr lang="en-US" dirty="0"/>
+              <a:rPr lang="en-US" sz="2600" dirty="0"/>
               <a:t>Switches are </a:t>
             </a:r>
             <a:r>
-              <a:rPr lang="en-US" dirty="0">
+              <a:rPr lang="en-US" sz="2600" dirty="0">
                 <a:solidFill>
-                  <a:srgbClr val="002060"/>
+                  <a:srgbClr val="0070C0"/>
                 </a:solidFill>
               </a:rPr>
               <a:t>modern bridges </a:t>
             </a:r>
             <a:r>
-              <a:rPr lang="en-US" dirty="0"/>
+              <a:rPr lang="en-US" sz="2600" dirty="0"/>
               <a:t>by another name. It acts as multiport bridge to connect devices or segments in a LAN. It operates at data link layer.</a:t>
             </a:r>
           </a:p>
           <a:p>
             <a:pPr algn="just"/>
             <a:r>
-              <a:rPr lang="en-US" dirty="0"/>
+              <a:rPr lang="en-US" sz="2600" dirty="0"/>
               <a:t>It is </a:t>
             </a:r>
             <a:r>
-              <a:rPr lang="en-US" b="1" dirty="0"/>
+              <a:rPr lang="en-US" sz="2600" b="1" dirty="0"/>
               <a:t>point to point </a:t>
             </a:r>
             <a:r>
-              <a:rPr lang="en-US" dirty="0"/>
+              <a:rPr lang="en-US" sz="2600" dirty="0"/>
               <a:t>device.</a:t>
             </a:r>
           </a:p>
           <a:p>
             <a:pPr algn="just"/>
             <a:r>
-              <a:rPr lang="en-US" dirty="0"/>
+              <a:rPr lang="en-US" sz="2600" dirty="0"/>
               <a:t>It is an </a:t>
             </a:r>
             <a:r>
-              <a:rPr lang="en-US" b="1" dirty="0"/>
+              <a:rPr lang="en-US" sz="2600" b="1" dirty="0"/>
               <a:t>intelligent</a:t>
             </a:r>
             <a:r>
-              <a:rPr lang="en-US" dirty="0"/>
+              <a:rPr lang="en-US" sz="2600" dirty="0"/>
               <a:t> device. It uses switching table to find the correct destination.</a:t>
             </a:r>
           </a:p>
           <a:p>
             <a:pPr algn="just"/>
             <a:r>
-              <a:rPr lang="en-US" dirty="0"/>
+              <a:rPr lang="en-US" sz="2600" dirty="0"/>
               <a:t>Switches are of two types: </a:t>
             </a:r>
           </a:p>
@@ -4215,7 +4325,7 @@
           <a:p>
             <a:pPr algn="just"/>
             <a:r>
-              <a:rPr lang="en-US" dirty="0"/>
+              <a:rPr lang="en-US" sz="2600" dirty="0"/>
               <a:t>Also there are layer 2 (bridge) and layer 3 switches (kind of router). It is sophisticated and expensive device.</a:t>
             </a:r>
           </a:p>
@@ -4425,7 +4535,7 @@
             <a:pPr algn="just"/>
             <a:r>
               <a:rPr lang="en-US" sz="2400" dirty="0"/>
-              <a:t> These are special symbols, which cannot occur in the payload. This process is called </a:t>
+              <a:t>These are special symbols, which cannot occur in the payload. This process is called </a:t>
             </a:r>
             <a:r>
               <a:rPr lang="en-US" sz="2400" i="1" dirty="0"/>
@@ -4510,6 +4620,7 @@
           <a:bodyPr/>
           <a:lstStyle/>
           <a:p>
+            <a:pPr algn="just"/>
             <a:r>
               <a:rPr lang="en-US" dirty="0">
                 <a:latin typeface="Garamond" panose="02020404030301010803" pitchFamily="18" charset="0"/>
@@ -4533,6 +4644,7 @@
             </a:r>
           </a:p>
           <a:p>
+            <a:pPr algn="just"/>
             <a:r>
               <a:rPr lang="en-US" dirty="0">
                 <a:latin typeface="Garamond" panose="02020404030301010803" pitchFamily="18" charset="0"/>
@@ -4542,6 +4654,7 @@
             </a:r>
           </a:p>
           <a:p>
+            <a:pPr algn="just"/>
             <a:r>
               <a:rPr lang="en-US" dirty="0">
                 <a:latin typeface="Garamond" panose="02020404030301010803" pitchFamily="18" charset="0"/>

</xml_diff>